<commit_message>
desing files, ltspice and maxwell
</commit_message>
<xml_diff>
--- a/Synhronous motor/Presentation/Design.pptx
+++ b/Synhronous motor/Presentation/Design.pptx
@@ -298,7 +298,7 @@
           <a:p>
             <a:fld id="{20930337-9DE0-481A-9DA4-22E60F373907}" type="datetimeFigureOut">
               <a:rPr lang="en-US" smtClean="0"/>
-              <a:t>4/20/2022</a:t>
+              <a:t>4/21/2022</a:t>
             </a:fld>
             <a:endParaRPr lang="en-US"/>
           </a:p>
@@ -496,7 +496,7 @@
           <a:p>
             <a:fld id="{20930337-9DE0-481A-9DA4-22E60F373907}" type="datetimeFigureOut">
               <a:rPr lang="en-US" smtClean="0"/>
-              <a:t>4/20/2022</a:t>
+              <a:t>4/21/2022</a:t>
             </a:fld>
             <a:endParaRPr lang="en-US"/>
           </a:p>
@@ -704,7 +704,7 @@
           <a:p>
             <a:fld id="{20930337-9DE0-481A-9DA4-22E60F373907}" type="datetimeFigureOut">
               <a:rPr lang="en-US" smtClean="0"/>
-              <a:t>4/20/2022</a:t>
+              <a:t>4/21/2022</a:t>
             </a:fld>
             <a:endParaRPr lang="en-US"/>
           </a:p>
@@ -902,7 +902,7 @@
           <a:p>
             <a:fld id="{20930337-9DE0-481A-9DA4-22E60F373907}" type="datetimeFigureOut">
               <a:rPr lang="en-US" smtClean="0"/>
-              <a:t>4/20/2022</a:t>
+              <a:t>4/21/2022</a:t>
             </a:fld>
             <a:endParaRPr lang="en-US"/>
           </a:p>
@@ -1177,7 +1177,7 @@
           <a:p>
             <a:fld id="{20930337-9DE0-481A-9DA4-22E60F373907}" type="datetimeFigureOut">
               <a:rPr lang="en-US" smtClean="0"/>
-              <a:t>4/20/2022</a:t>
+              <a:t>4/21/2022</a:t>
             </a:fld>
             <a:endParaRPr lang="en-US"/>
           </a:p>
@@ -1442,7 +1442,7 @@
           <a:p>
             <a:fld id="{20930337-9DE0-481A-9DA4-22E60F373907}" type="datetimeFigureOut">
               <a:rPr lang="en-US" smtClean="0"/>
-              <a:t>4/20/2022</a:t>
+              <a:t>4/21/2022</a:t>
             </a:fld>
             <a:endParaRPr lang="en-US"/>
           </a:p>
@@ -1854,7 +1854,7 @@
           <a:p>
             <a:fld id="{20930337-9DE0-481A-9DA4-22E60F373907}" type="datetimeFigureOut">
               <a:rPr lang="en-US" smtClean="0"/>
-              <a:t>4/20/2022</a:t>
+              <a:t>4/21/2022</a:t>
             </a:fld>
             <a:endParaRPr lang="en-US"/>
           </a:p>
@@ -1995,7 +1995,7 @@
           <a:p>
             <a:fld id="{20930337-9DE0-481A-9DA4-22E60F373907}" type="datetimeFigureOut">
               <a:rPr lang="en-US" smtClean="0"/>
-              <a:t>4/20/2022</a:t>
+              <a:t>4/21/2022</a:t>
             </a:fld>
             <a:endParaRPr lang="en-US"/>
           </a:p>
@@ -2108,7 +2108,7 @@
           <a:p>
             <a:fld id="{20930337-9DE0-481A-9DA4-22E60F373907}" type="datetimeFigureOut">
               <a:rPr lang="en-US" smtClean="0"/>
-              <a:t>4/20/2022</a:t>
+              <a:t>4/21/2022</a:t>
             </a:fld>
             <a:endParaRPr lang="en-US"/>
           </a:p>
@@ -2419,7 +2419,7 @@
           <a:p>
             <a:fld id="{20930337-9DE0-481A-9DA4-22E60F373907}" type="datetimeFigureOut">
               <a:rPr lang="en-US" smtClean="0"/>
-              <a:t>4/20/2022</a:t>
+              <a:t>4/21/2022</a:t>
             </a:fld>
             <a:endParaRPr lang="en-US"/>
           </a:p>
@@ -2707,7 +2707,7 @@
           <a:p>
             <a:fld id="{20930337-9DE0-481A-9DA4-22E60F373907}" type="datetimeFigureOut">
               <a:rPr lang="en-US" smtClean="0"/>
-              <a:t>4/20/2022</a:t>
+              <a:t>4/21/2022</a:t>
             </a:fld>
             <a:endParaRPr lang="en-US"/>
           </a:p>
@@ -2948,7 +2948,7 @@
           <a:p>
             <a:fld id="{20930337-9DE0-481A-9DA4-22E60F373907}" type="datetimeFigureOut">
               <a:rPr lang="en-US" smtClean="0"/>
-              <a:t>4/20/2022</a:t>
+              <a:t>4/21/2022</a:t>
             </a:fld>
             <a:endParaRPr lang="en-US"/>
           </a:p>
@@ -3379,8 +3379,8 @@
         </p:nvSpPr>
         <p:spPr>
           <a:xfrm>
-            <a:off x="448007" y="482599"/>
-            <a:ext cx="2923265" cy="1614055"/>
+            <a:off x="448008" y="482599"/>
+            <a:ext cx="3910928" cy="1614055"/>
           </a:xfrm>
           <a:prstGeom prst="rect">
             <a:avLst/>
@@ -3434,7 +3434,7 @@
                   <a:schemeClr val="tx1"/>
                 </a:solidFill>
               </a:rPr>
-              <a:t>DC-link voltage</a:t>
+              <a:t>DC-link voltage  (400 V)</a:t>
             </a:r>
           </a:p>
           <a:p>
@@ -3448,7 +3448,7 @@
                   <a:schemeClr val="tx1"/>
                 </a:solidFill>
               </a:rPr>
-              <a:t>Modulation </a:t>
+              <a:t>Modulation       (SPWM)</a:t>
             </a:r>
           </a:p>
           <a:p>
@@ -3462,7 +3462,7 @@
                   <a:schemeClr val="tx1"/>
                 </a:solidFill>
               </a:rPr>
-              <a:t>Phase Current</a:t>
+              <a:t>Phase Current   (10 A)</a:t>
             </a:r>
           </a:p>
           <a:p>
@@ -3476,7 +3476,7 @@
                   <a:schemeClr val="tx1"/>
                 </a:solidFill>
               </a:rPr>
-              <a:t>Field Voltage/Current</a:t>
+              <a:t>Field Voltage/Current (15 V-15A)</a:t>
             </a:r>
           </a:p>
           <a:p>
@@ -4033,8 +4033,8 @@
           <a:chExt cx="0" cy="0"/>
         </a:xfrm>
       </p:grpSpPr>
-      <mc:AlternateContent xmlns:mc="http://schemas.openxmlformats.org/markup-compatibility/2006">
-        <mc:Choice xmlns:a14="http://schemas.microsoft.com/office/drawing/2010/main" Requires="a14">
+      <mc:AlternateContent xmlns:mc="http://schemas.openxmlformats.org/markup-compatibility/2006" xmlns:a14="http://schemas.microsoft.com/office/drawing/2010/main">
+        <mc:Choice Requires="a14">
           <p:graphicFrame>
             <p:nvGraphicFramePr>
               <p:cNvPr id="5" name="Table 4">
@@ -4704,13 +4704,7 @@
                                   <a:rPr lang="en-US" b="0" i="1" smtClean="0">
                                     <a:latin typeface="Cambria Math" panose="02040503050406030204" pitchFamily="18" charset="0"/>
                                   </a:rPr>
-                                  <m:t>8.15</m:t>
-                                </m:r>
-                                <m:r>
-                                  <a:rPr lang="en-US" b="0" i="1" smtClean="0">
-                                    <a:latin typeface="Cambria Math" panose="02040503050406030204" pitchFamily="18" charset="0"/>
-                                  </a:rPr>
-                                  <m:t>  </m:t>
+                                  <m:t>8.15  </m:t>
                                 </m:r>
                                 <m:r>
                                   <a:rPr lang="en-US" b="0" i="1" smtClean="0">
@@ -5181,13 +5175,7 @@
                                   <a:rPr lang="en-US" b="0" i="1" smtClean="0">
                                     <a:latin typeface="Cambria Math" panose="02040503050406030204" pitchFamily="18" charset="0"/>
                                   </a:rPr>
-                                  <m:t>2336</m:t>
-                                </m:r>
-                                <m:r>
-                                  <a:rPr lang="en-US" b="0" i="1" smtClean="0">
-                                    <a:latin typeface="Cambria Math" panose="02040503050406030204" pitchFamily="18" charset="0"/>
-                                  </a:rPr>
-                                  <m:t> </m:t>
+                                  <m:t>2336 </m:t>
                                 </m:r>
                                 <m:r>
                                   <a:rPr lang="en-US" b="0" i="1" smtClean="0">
@@ -5658,13 +5646,7 @@
                                   <a:rPr lang="en-US" b="0" i="1" smtClean="0">
                                     <a:latin typeface="Cambria Math" panose="02040503050406030204" pitchFamily="18" charset="0"/>
                                   </a:rPr>
-                                  <m:t>99.7</m:t>
-                                </m:r>
-                                <m:r>
-                                  <a:rPr lang="en-US" b="0" i="1" smtClean="0">
-                                    <a:latin typeface="Cambria Math" panose="02040503050406030204" pitchFamily="18" charset="0"/>
-                                  </a:rPr>
-                                  <m:t>  </m:t>
+                                  <m:t>99.7  </m:t>
                                 </m:r>
                                 <m:r>
                                   <a:rPr lang="en-US" b="0" i="1" smtClean="0">
@@ -6190,7 +6172,7 @@
             </a:graphic>
           </p:graphicFrame>
         </mc:Choice>
-        <mc:Fallback>
+        <mc:Fallback xmlns="">
           <p:graphicFrame>
             <p:nvGraphicFramePr>
               <p:cNvPr id="5" name="Table 4">

</xml_diff>